<commit_message>
BRTs rerun without Q99
</commit_message>
<xml_diff>
--- a/figures/all_figures.pptx
+++ b/figures/all_figures.pptx
@@ -5,11 +5,12 @@
     <p:sldMasterId id="2147483648" r:id="rId1"/>
   </p:sldMasterIdLst>
   <p:notesMasterIdLst>
-    <p:notesMasterId r:id="rId4"/>
+    <p:notesMasterId r:id="rId5"/>
   </p:notesMasterIdLst>
   <p:sldIdLst>
     <p:sldId id="256" r:id="rId2"/>
     <p:sldId id="258" r:id="rId3"/>
+    <p:sldId id="259" r:id="rId4"/>
   </p:sldIdLst>
   <p:sldSz cx="12192000" cy="6858000"/>
   <p:notesSz cx="6858000" cy="9144000"/>
@@ -108,6 +109,11 @@
       </a:defRPr>
     </a:lvl9pPr>
   </p:defaultTextStyle>
+  <p:extLst>
+    <p:ext uri="{EFAFB233-063F-42B5-8137-9DF3F51BA10A}">
+      <p15:sldGuideLst xmlns:p15="http://schemas.microsoft.com/office/powerpoint/2012/main"/>
+    </p:ext>
+  </p:extLst>
 </p:presentation>
 </file>
 
@@ -193,7 +199,7 @@
           <a:p>
             <a:fld id="{B5AD3C56-DACC-8D45-B377-7842C4A6E390}" type="datetimeFigureOut">
               <a:rPr lang="en-US" smtClean="0"/>
-              <a:t>3/23/22</a:t>
+              <a:t>3/29/22</a:t>
             </a:fld>
             <a:endParaRPr lang="en-US"/>
           </a:p>
@@ -781,7 +787,7 @@
           <a:p>
             <a:fld id="{FC52B070-708A-9A41-926C-C6A83D288760}" type="datetimeFigureOut">
               <a:rPr lang="en-US" smtClean="0"/>
-              <a:t>3/23/22</a:t>
+              <a:t>3/29/22</a:t>
             </a:fld>
             <a:endParaRPr lang="en-US"/>
           </a:p>
@@ -979,7 +985,7 @@
           <a:p>
             <a:fld id="{FC52B070-708A-9A41-926C-C6A83D288760}" type="datetimeFigureOut">
               <a:rPr lang="en-US" smtClean="0"/>
-              <a:t>3/23/22</a:t>
+              <a:t>3/29/22</a:t>
             </a:fld>
             <a:endParaRPr lang="en-US"/>
           </a:p>
@@ -1187,7 +1193,7 @@
           <a:p>
             <a:fld id="{FC52B070-708A-9A41-926C-C6A83D288760}" type="datetimeFigureOut">
               <a:rPr lang="en-US" smtClean="0"/>
-              <a:t>3/23/22</a:t>
+              <a:t>3/29/22</a:t>
             </a:fld>
             <a:endParaRPr lang="en-US"/>
           </a:p>
@@ -1385,7 +1391,7 @@
           <a:p>
             <a:fld id="{FC52B070-708A-9A41-926C-C6A83D288760}" type="datetimeFigureOut">
               <a:rPr lang="en-US" smtClean="0"/>
-              <a:t>3/23/22</a:t>
+              <a:t>3/29/22</a:t>
             </a:fld>
             <a:endParaRPr lang="en-US"/>
           </a:p>
@@ -1660,7 +1666,7 @@
           <a:p>
             <a:fld id="{FC52B070-708A-9A41-926C-C6A83D288760}" type="datetimeFigureOut">
               <a:rPr lang="en-US" smtClean="0"/>
-              <a:t>3/23/22</a:t>
+              <a:t>3/29/22</a:t>
             </a:fld>
             <a:endParaRPr lang="en-US"/>
           </a:p>
@@ -1925,7 +1931,7 @@
           <a:p>
             <a:fld id="{FC52B070-708A-9A41-926C-C6A83D288760}" type="datetimeFigureOut">
               <a:rPr lang="en-US" smtClean="0"/>
-              <a:t>3/23/22</a:t>
+              <a:t>3/29/22</a:t>
             </a:fld>
             <a:endParaRPr lang="en-US"/>
           </a:p>
@@ -2337,7 +2343,7 @@
           <a:p>
             <a:fld id="{FC52B070-708A-9A41-926C-C6A83D288760}" type="datetimeFigureOut">
               <a:rPr lang="en-US" smtClean="0"/>
-              <a:t>3/23/22</a:t>
+              <a:t>3/29/22</a:t>
             </a:fld>
             <a:endParaRPr lang="en-US"/>
           </a:p>
@@ -2478,7 +2484,7 @@
           <a:p>
             <a:fld id="{FC52B070-708A-9A41-926C-C6A83D288760}" type="datetimeFigureOut">
               <a:rPr lang="en-US" smtClean="0"/>
-              <a:t>3/23/22</a:t>
+              <a:t>3/29/22</a:t>
             </a:fld>
             <a:endParaRPr lang="en-US"/>
           </a:p>
@@ -2591,7 +2597,7 @@
           <a:p>
             <a:fld id="{FC52B070-708A-9A41-926C-C6A83D288760}" type="datetimeFigureOut">
               <a:rPr lang="en-US" smtClean="0"/>
-              <a:t>3/23/22</a:t>
+              <a:t>3/29/22</a:t>
             </a:fld>
             <a:endParaRPr lang="en-US"/>
           </a:p>
@@ -2902,7 +2908,7 @@
           <a:p>
             <a:fld id="{FC52B070-708A-9A41-926C-C6A83D288760}" type="datetimeFigureOut">
               <a:rPr lang="en-US" smtClean="0"/>
-              <a:t>3/23/22</a:t>
+              <a:t>3/29/22</a:t>
             </a:fld>
             <a:endParaRPr lang="en-US"/>
           </a:p>
@@ -3190,7 +3196,7 @@
           <a:p>
             <a:fld id="{FC52B070-708A-9A41-926C-C6A83D288760}" type="datetimeFigureOut">
               <a:rPr lang="en-US" smtClean="0"/>
-              <a:t>3/23/22</a:t>
+              <a:t>3/29/22</a:t>
             </a:fld>
             <a:endParaRPr lang="en-US"/>
           </a:p>
@@ -3431,7 +3437,7 @@
           <a:p>
             <a:fld id="{FC52B070-708A-9A41-926C-C6A83D288760}" type="datetimeFigureOut">
               <a:rPr lang="en-US" smtClean="0"/>
-              <a:t>3/23/22</a:t>
+              <a:t>3/29/22</a:t>
             </a:fld>
             <a:endParaRPr lang="en-US"/>
           </a:p>
@@ -3870,7 +3876,7 @@
         <p:spPr>
           <a:xfrm>
             <a:off x="6322543" y="74142"/>
-            <a:ext cx="4916959" cy="3277972"/>
+            <a:ext cx="4916958" cy="3277972"/>
           </a:xfrm>
           <a:prstGeom prst="rect">
             <a:avLst/>
@@ -3879,7 +3885,7 @@
       </p:pic>
       <p:pic>
         <p:nvPicPr>
-          <p:cNvPr id="7" name="Picture 6" descr="Chart&#10;&#10;Description automatically generated">
+          <p:cNvPr id="7" name="Picture 6">
             <a:extLst>
               <a:ext uri="{FF2B5EF4-FFF2-40B4-BE49-F238E27FC236}">
                 <a16:creationId xmlns:a16="http://schemas.microsoft.com/office/drawing/2014/main" id="{40C1F4C7-C15D-D34F-80CB-58BC5790B798}"/>
@@ -3893,14 +3899,13 @@
         </p:nvPicPr>
         <p:blipFill>
           <a:blip r:embed="rId4"/>
-          <a:stretch>
-            <a:fillRect/>
-          </a:stretch>
+          <a:srcRect/>
+          <a:stretch/>
         </p:blipFill>
         <p:spPr>
           <a:xfrm>
             <a:off x="6322543" y="3136903"/>
-            <a:ext cx="4916959" cy="3277973"/>
+            <a:ext cx="4916959" cy="3277972"/>
           </a:xfrm>
           <a:prstGeom prst="rect">
             <a:avLst/>
@@ -3965,6 +3970,292 @@
           </a:prstGeom>
         </p:spPr>
       </p:pic>
+      <p:sp>
+        <p:nvSpPr>
+          <p:cNvPr id="6" name="Rectangle 5">
+            <a:extLst>
+              <a:ext uri="{FF2B5EF4-FFF2-40B4-BE49-F238E27FC236}">
+                <a16:creationId xmlns:a16="http://schemas.microsoft.com/office/drawing/2014/main" id="{495F9224-2071-454A-B46C-F87660C1B91B}"/>
+              </a:ext>
+            </a:extLst>
+          </p:cNvPr>
+          <p:cNvSpPr/>
+          <p:nvPr/>
+        </p:nvSpPr>
+        <p:spPr>
+          <a:xfrm>
+            <a:off x="2655860" y="74142"/>
+            <a:ext cx="2888673" cy="268758"/>
+          </a:xfrm>
+          <a:prstGeom prst="rect">
+            <a:avLst/>
+          </a:prstGeom>
+          <a:solidFill>
+            <a:schemeClr val="bg1"/>
+          </a:solidFill>
+          <a:ln>
+            <a:solidFill>
+              <a:schemeClr val="bg1"/>
+            </a:solidFill>
+          </a:ln>
+        </p:spPr>
+        <p:style>
+          <a:lnRef idx="2">
+            <a:schemeClr val="accent1">
+              <a:shade val="50000"/>
+            </a:schemeClr>
+          </a:lnRef>
+          <a:fillRef idx="1">
+            <a:schemeClr val="accent1"/>
+          </a:fillRef>
+          <a:effectRef idx="0">
+            <a:schemeClr val="accent1"/>
+          </a:effectRef>
+          <a:fontRef idx="minor">
+            <a:schemeClr val="lt1"/>
+          </a:fontRef>
+        </p:style>
+        <p:txBody>
+          <a:bodyPr rtlCol="0" anchor="ctr"/>
+          <a:lstStyle/>
+          <a:p>
+            <a:pPr algn="ctr"/>
+            <a:endParaRPr lang="en-US"/>
+          </a:p>
+        </p:txBody>
+      </p:sp>
+      <p:sp>
+        <p:nvSpPr>
+          <p:cNvPr id="8" name="Rectangle 7">
+            <a:extLst>
+              <a:ext uri="{FF2B5EF4-FFF2-40B4-BE49-F238E27FC236}">
+                <a16:creationId xmlns:a16="http://schemas.microsoft.com/office/drawing/2014/main" id="{9D2F8799-5A76-8B4E-BC3E-6894CE6BEB8E}"/>
+              </a:ext>
+            </a:extLst>
+          </p:cNvPr>
+          <p:cNvSpPr/>
+          <p:nvPr/>
+        </p:nvSpPr>
+        <p:spPr>
+          <a:xfrm>
+            <a:off x="2819074" y="3117337"/>
+            <a:ext cx="2888673" cy="268758"/>
+          </a:xfrm>
+          <a:prstGeom prst="rect">
+            <a:avLst/>
+          </a:prstGeom>
+          <a:solidFill>
+            <a:schemeClr val="bg1"/>
+          </a:solidFill>
+          <a:ln>
+            <a:solidFill>
+              <a:schemeClr val="bg1"/>
+            </a:solidFill>
+          </a:ln>
+        </p:spPr>
+        <p:style>
+          <a:lnRef idx="2">
+            <a:schemeClr val="accent1">
+              <a:shade val="50000"/>
+            </a:schemeClr>
+          </a:lnRef>
+          <a:fillRef idx="1">
+            <a:schemeClr val="accent1"/>
+          </a:fillRef>
+          <a:effectRef idx="0">
+            <a:schemeClr val="accent1"/>
+          </a:effectRef>
+          <a:fontRef idx="minor">
+            <a:schemeClr val="lt1"/>
+          </a:fontRef>
+        </p:style>
+        <p:txBody>
+          <a:bodyPr rtlCol="0" anchor="ctr"/>
+          <a:lstStyle/>
+          <a:p>
+            <a:pPr algn="ctr"/>
+            <a:endParaRPr lang="en-US"/>
+          </a:p>
+        </p:txBody>
+      </p:sp>
+      <p:sp>
+        <p:nvSpPr>
+          <p:cNvPr id="10" name="Rectangle 9">
+            <a:extLst>
+              <a:ext uri="{FF2B5EF4-FFF2-40B4-BE49-F238E27FC236}">
+                <a16:creationId xmlns:a16="http://schemas.microsoft.com/office/drawing/2014/main" id="{2102CEA0-4008-5842-B063-A280AEAEAABA}"/>
+              </a:ext>
+            </a:extLst>
+          </p:cNvPr>
+          <p:cNvSpPr/>
+          <p:nvPr/>
+        </p:nvSpPr>
+        <p:spPr>
+          <a:xfrm>
+            <a:off x="6690858" y="72598"/>
+            <a:ext cx="2888673" cy="268758"/>
+          </a:xfrm>
+          <a:prstGeom prst="rect">
+            <a:avLst/>
+          </a:prstGeom>
+          <a:solidFill>
+            <a:schemeClr val="bg1"/>
+          </a:solidFill>
+          <a:ln>
+            <a:solidFill>
+              <a:schemeClr val="bg1"/>
+            </a:solidFill>
+          </a:ln>
+        </p:spPr>
+        <p:style>
+          <a:lnRef idx="2">
+            <a:schemeClr val="accent1">
+              <a:shade val="50000"/>
+            </a:schemeClr>
+          </a:lnRef>
+          <a:fillRef idx="1">
+            <a:schemeClr val="accent1"/>
+          </a:fillRef>
+          <a:effectRef idx="0">
+            <a:schemeClr val="accent1"/>
+          </a:effectRef>
+          <a:fontRef idx="minor">
+            <a:schemeClr val="lt1"/>
+          </a:fontRef>
+        </p:style>
+        <p:txBody>
+          <a:bodyPr rtlCol="0" anchor="ctr"/>
+          <a:lstStyle/>
+          <a:p>
+            <a:pPr algn="ctr"/>
+            <a:endParaRPr lang="en-US"/>
+          </a:p>
+        </p:txBody>
+      </p:sp>
+      <p:sp>
+        <p:nvSpPr>
+          <p:cNvPr id="12" name="Rectangle 11">
+            <a:extLst>
+              <a:ext uri="{FF2B5EF4-FFF2-40B4-BE49-F238E27FC236}">
+                <a16:creationId xmlns:a16="http://schemas.microsoft.com/office/drawing/2014/main" id="{9B8DB110-49D1-8346-860A-29BABCDBB13F}"/>
+              </a:ext>
+            </a:extLst>
+          </p:cNvPr>
+          <p:cNvSpPr/>
+          <p:nvPr/>
+        </p:nvSpPr>
+        <p:spPr>
+          <a:xfrm>
+            <a:off x="6535185" y="3002692"/>
+            <a:ext cx="2888673" cy="362296"/>
+          </a:xfrm>
+          <a:prstGeom prst="rect">
+            <a:avLst/>
+          </a:prstGeom>
+          <a:solidFill>
+            <a:schemeClr val="bg1"/>
+          </a:solidFill>
+          <a:ln>
+            <a:solidFill>
+              <a:schemeClr val="bg1"/>
+            </a:solidFill>
+          </a:ln>
+        </p:spPr>
+        <p:style>
+          <a:lnRef idx="2">
+            <a:schemeClr val="accent1">
+              <a:shade val="50000"/>
+            </a:schemeClr>
+          </a:lnRef>
+          <a:fillRef idx="1">
+            <a:schemeClr val="accent1"/>
+          </a:fillRef>
+          <a:effectRef idx="0">
+            <a:schemeClr val="accent1"/>
+          </a:effectRef>
+          <a:fontRef idx="minor">
+            <a:schemeClr val="lt1"/>
+          </a:fontRef>
+        </p:style>
+        <p:txBody>
+          <a:bodyPr rtlCol="0" anchor="ctr"/>
+          <a:lstStyle/>
+          <a:p>
+            <a:pPr algn="ctr"/>
+            <a:endParaRPr lang="en-US"/>
+          </a:p>
+        </p:txBody>
+      </p:sp>
+      <p:sp>
+        <p:nvSpPr>
+          <p:cNvPr id="2" name="TextBox 1">
+            <a:extLst>
+              <a:ext uri="{FF2B5EF4-FFF2-40B4-BE49-F238E27FC236}">
+                <a16:creationId xmlns:a16="http://schemas.microsoft.com/office/drawing/2014/main" id="{7E59E461-D512-4F4A-91BC-595AEB8216ED}"/>
+              </a:ext>
+            </a:extLst>
+          </p:cNvPr>
+          <p:cNvSpPr txBox="1"/>
+          <p:nvPr/>
+        </p:nvSpPr>
+        <p:spPr>
+          <a:xfrm>
+            <a:off x="2134646" y="156690"/>
+            <a:ext cx="365806" cy="369332"/>
+          </a:xfrm>
+          <a:prstGeom prst="rect">
+            <a:avLst/>
+          </a:prstGeom>
+          <a:noFill/>
+        </p:spPr>
+        <p:txBody>
+          <a:bodyPr wrap="none" rtlCol="0">
+            <a:spAutoFit/>
+          </a:bodyPr>
+          <a:lstStyle/>
+          <a:p>
+            <a:r>
+              <a:rPr lang="en-US" dirty="0"/>
+              <a:t>a)</a:t>
+            </a:r>
+          </a:p>
+        </p:txBody>
+      </p:sp>
+      <p:sp>
+        <p:nvSpPr>
+          <p:cNvPr id="13" name="TextBox 12">
+            <a:extLst>
+              <a:ext uri="{FF2B5EF4-FFF2-40B4-BE49-F238E27FC236}">
+                <a16:creationId xmlns:a16="http://schemas.microsoft.com/office/drawing/2014/main" id="{8AA8C81F-CE3F-0D4F-9319-A80F64466C09}"/>
+              </a:ext>
+            </a:extLst>
+          </p:cNvPr>
+          <p:cNvSpPr txBox="1"/>
+          <p:nvPr/>
+        </p:nvSpPr>
+        <p:spPr>
+          <a:xfrm>
+            <a:off x="2134646" y="3271796"/>
+            <a:ext cx="377026" cy="369332"/>
+          </a:xfrm>
+          <a:prstGeom prst="rect">
+            <a:avLst/>
+          </a:prstGeom>
+          <a:noFill/>
+        </p:spPr>
+        <p:txBody>
+          <a:bodyPr wrap="none" rtlCol="0">
+            <a:spAutoFit/>
+          </a:bodyPr>
+          <a:lstStyle/>
+          <a:p>
+            <a:r>
+              <a:rPr lang="en-US" dirty="0"/>
+              <a:t>b)</a:t>
+            </a:r>
+          </a:p>
+        </p:txBody>
+      </p:sp>
     </p:spTree>
     <p:extLst>
       <p:ext uri="{BB962C8B-B14F-4D97-AF65-F5344CB8AC3E}">
@@ -4017,7 +4308,7 @@
         <p:spPr>
           <a:xfrm>
             <a:off x="6322543" y="74142"/>
-            <a:ext cx="4916959" cy="3277972"/>
+            <a:ext cx="4916958" cy="3277972"/>
           </a:xfrm>
           <a:prstGeom prst="rect">
             <a:avLst/>
@@ -4046,7 +4337,7 @@
         <p:spPr>
           <a:xfrm>
             <a:off x="6322543" y="3149259"/>
-            <a:ext cx="4916959" cy="3277972"/>
+            <a:ext cx="4916958" cy="3277972"/>
           </a:xfrm>
           <a:prstGeom prst="rect">
             <a:avLst/>
@@ -4111,10 +4402,413 @@
           </a:prstGeom>
         </p:spPr>
       </p:pic>
+      <p:sp>
+        <p:nvSpPr>
+          <p:cNvPr id="2" name="Rectangle 1">
+            <a:extLst>
+              <a:ext uri="{FF2B5EF4-FFF2-40B4-BE49-F238E27FC236}">
+                <a16:creationId xmlns:a16="http://schemas.microsoft.com/office/drawing/2014/main" id="{94365F2E-97A5-B140-81E4-15F2D501F179}"/>
+              </a:ext>
+            </a:extLst>
+          </p:cNvPr>
+          <p:cNvSpPr/>
+          <p:nvPr/>
+        </p:nvSpPr>
+        <p:spPr>
+          <a:xfrm>
+            <a:off x="2421081" y="33984"/>
+            <a:ext cx="2888673" cy="268758"/>
+          </a:xfrm>
+          <a:prstGeom prst="rect">
+            <a:avLst/>
+          </a:prstGeom>
+          <a:solidFill>
+            <a:schemeClr val="bg1"/>
+          </a:solidFill>
+          <a:ln>
+            <a:solidFill>
+              <a:schemeClr val="bg1"/>
+            </a:solidFill>
+          </a:ln>
+        </p:spPr>
+        <p:style>
+          <a:lnRef idx="2">
+            <a:schemeClr val="accent1">
+              <a:shade val="50000"/>
+            </a:schemeClr>
+          </a:lnRef>
+          <a:fillRef idx="1">
+            <a:schemeClr val="accent1"/>
+          </a:fillRef>
+          <a:effectRef idx="0">
+            <a:schemeClr val="accent1"/>
+          </a:effectRef>
+          <a:fontRef idx="minor">
+            <a:schemeClr val="lt1"/>
+          </a:fontRef>
+        </p:style>
+        <p:txBody>
+          <a:bodyPr rtlCol="0" anchor="ctr"/>
+          <a:lstStyle/>
+          <a:p>
+            <a:pPr algn="ctr"/>
+            <a:endParaRPr lang="en-US"/>
+          </a:p>
+        </p:txBody>
+      </p:sp>
+      <p:sp>
+        <p:nvSpPr>
+          <p:cNvPr id="8" name="Rectangle 7">
+            <a:extLst>
+              <a:ext uri="{FF2B5EF4-FFF2-40B4-BE49-F238E27FC236}">
+                <a16:creationId xmlns:a16="http://schemas.microsoft.com/office/drawing/2014/main" id="{C0C76185-8C5D-AE44-AE1E-0C2FD4B5680D}"/>
+              </a:ext>
+            </a:extLst>
+          </p:cNvPr>
+          <p:cNvSpPr/>
+          <p:nvPr/>
+        </p:nvSpPr>
+        <p:spPr>
+          <a:xfrm>
+            <a:off x="2421081" y="3204746"/>
+            <a:ext cx="2888673" cy="268758"/>
+          </a:xfrm>
+          <a:prstGeom prst="rect">
+            <a:avLst/>
+          </a:prstGeom>
+          <a:solidFill>
+            <a:schemeClr val="bg1"/>
+          </a:solidFill>
+          <a:ln>
+            <a:solidFill>
+              <a:schemeClr val="bg1"/>
+            </a:solidFill>
+          </a:ln>
+        </p:spPr>
+        <p:style>
+          <a:lnRef idx="2">
+            <a:schemeClr val="accent1">
+              <a:shade val="50000"/>
+            </a:schemeClr>
+          </a:lnRef>
+          <a:fillRef idx="1">
+            <a:schemeClr val="accent1"/>
+          </a:fillRef>
+          <a:effectRef idx="0">
+            <a:schemeClr val="accent1"/>
+          </a:effectRef>
+          <a:fontRef idx="minor">
+            <a:schemeClr val="lt1"/>
+          </a:fontRef>
+        </p:style>
+        <p:txBody>
+          <a:bodyPr rtlCol="0" anchor="ctr"/>
+          <a:lstStyle/>
+          <a:p>
+            <a:pPr algn="ctr"/>
+            <a:endParaRPr lang="en-US"/>
+          </a:p>
+        </p:txBody>
+      </p:sp>
+      <p:sp>
+        <p:nvSpPr>
+          <p:cNvPr id="10" name="Rectangle 9">
+            <a:extLst>
+              <a:ext uri="{FF2B5EF4-FFF2-40B4-BE49-F238E27FC236}">
+                <a16:creationId xmlns:a16="http://schemas.microsoft.com/office/drawing/2014/main" id="{9A7CD8B6-66DB-754D-84EE-FB7BCF1FDC21}"/>
+              </a:ext>
+            </a:extLst>
+          </p:cNvPr>
+          <p:cNvSpPr/>
+          <p:nvPr/>
+        </p:nvSpPr>
+        <p:spPr>
+          <a:xfrm>
+            <a:off x="6653134" y="33984"/>
+            <a:ext cx="2888673" cy="268758"/>
+          </a:xfrm>
+          <a:prstGeom prst="rect">
+            <a:avLst/>
+          </a:prstGeom>
+          <a:solidFill>
+            <a:schemeClr val="bg1"/>
+          </a:solidFill>
+          <a:ln>
+            <a:solidFill>
+              <a:schemeClr val="bg1"/>
+            </a:solidFill>
+          </a:ln>
+        </p:spPr>
+        <p:style>
+          <a:lnRef idx="2">
+            <a:schemeClr val="accent1">
+              <a:shade val="50000"/>
+            </a:schemeClr>
+          </a:lnRef>
+          <a:fillRef idx="1">
+            <a:schemeClr val="accent1"/>
+          </a:fillRef>
+          <a:effectRef idx="0">
+            <a:schemeClr val="accent1"/>
+          </a:effectRef>
+          <a:fontRef idx="minor">
+            <a:schemeClr val="lt1"/>
+          </a:fontRef>
+        </p:style>
+        <p:txBody>
+          <a:bodyPr rtlCol="0" anchor="ctr"/>
+          <a:lstStyle/>
+          <a:p>
+            <a:pPr algn="ctr"/>
+            <a:endParaRPr lang="en-US"/>
+          </a:p>
+        </p:txBody>
+      </p:sp>
+      <p:sp>
+        <p:nvSpPr>
+          <p:cNvPr id="12" name="Rectangle 11">
+            <a:extLst>
+              <a:ext uri="{FF2B5EF4-FFF2-40B4-BE49-F238E27FC236}">
+                <a16:creationId xmlns:a16="http://schemas.microsoft.com/office/drawing/2014/main" id="{CDE15010-E9CE-DD4B-8D3A-3623D25E155B}"/>
+              </a:ext>
+            </a:extLst>
+          </p:cNvPr>
+          <p:cNvSpPr/>
+          <p:nvPr/>
+        </p:nvSpPr>
+        <p:spPr>
+          <a:xfrm>
+            <a:off x="6513090" y="3002692"/>
+            <a:ext cx="2888673" cy="387524"/>
+          </a:xfrm>
+          <a:prstGeom prst="rect">
+            <a:avLst/>
+          </a:prstGeom>
+          <a:solidFill>
+            <a:schemeClr val="bg1"/>
+          </a:solidFill>
+          <a:ln>
+            <a:solidFill>
+              <a:schemeClr val="bg1"/>
+            </a:solidFill>
+          </a:ln>
+        </p:spPr>
+        <p:style>
+          <a:lnRef idx="2">
+            <a:schemeClr val="accent1">
+              <a:shade val="50000"/>
+            </a:schemeClr>
+          </a:lnRef>
+          <a:fillRef idx="1">
+            <a:schemeClr val="accent1"/>
+          </a:fillRef>
+          <a:effectRef idx="0">
+            <a:schemeClr val="accent1"/>
+          </a:effectRef>
+          <a:fontRef idx="minor">
+            <a:schemeClr val="lt1"/>
+          </a:fontRef>
+        </p:style>
+        <p:txBody>
+          <a:bodyPr rtlCol="0" anchor="ctr"/>
+          <a:lstStyle/>
+          <a:p>
+            <a:pPr algn="ctr"/>
+            <a:endParaRPr lang="en-US"/>
+          </a:p>
+        </p:txBody>
+      </p:sp>
+      <p:sp>
+        <p:nvSpPr>
+          <p:cNvPr id="13" name="TextBox 12">
+            <a:extLst>
+              <a:ext uri="{FF2B5EF4-FFF2-40B4-BE49-F238E27FC236}">
+                <a16:creationId xmlns:a16="http://schemas.microsoft.com/office/drawing/2014/main" id="{35D0C283-61E4-F84A-AA7C-3452C40184EC}"/>
+              </a:ext>
+            </a:extLst>
+          </p:cNvPr>
+          <p:cNvSpPr txBox="1"/>
+          <p:nvPr/>
+        </p:nvSpPr>
+        <p:spPr>
+          <a:xfrm>
+            <a:off x="1862795" y="156690"/>
+            <a:ext cx="365806" cy="369332"/>
+          </a:xfrm>
+          <a:prstGeom prst="rect">
+            <a:avLst/>
+          </a:prstGeom>
+          <a:noFill/>
+        </p:spPr>
+        <p:txBody>
+          <a:bodyPr wrap="none" rtlCol="0">
+            <a:spAutoFit/>
+          </a:bodyPr>
+          <a:lstStyle/>
+          <a:p>
+            <a:r>
+              <a:rPr lang="en-US" dirty="0"/>
+              <a:t>a)</a:t>
+            </a:r>
+          </a:p>
+        </p:txBody>
+      </p:sp>
+      <p:sp>
+        <p:nvSpPr>
+          <p:cNvPr id="14" name="TextBox 13">
+            <a:extLst>
+              <a:ext uri="{FF2B5EF4-FFF2-40B4-BE49-F238E27FC236}">
+                <a16:creationId xmlns:a16="http://schemas.microsoft.com/office/drawing/2014/main" id="{F1599F46-D61F-784E-8A8E-05C1B6192821}"/>
+              </a:ext>
+            </a:extLst>
+          </p:cNvPr>
+          <p:cNvSpPr txBox="1"/>
+          <p:nvPr/>
+        </p:nvSpPr>
+        <p:spPr>
+          <a:xfrm>
+            <a:off x="1862795" y="3271796"/>
+            <a:ext cx="377026" cy="369332"/>
+          </a:xfrm>
+          <a:prstGeom prst="rect">
+            <a:avLst/>
+          </a:prstGeom>
+          <a:noFill/>
+        </p:spPr>
+        <p:txBody>
+          <a:bodyPr wrap="none" rtlCol="0">
+            <a:spAutoFit/>
+          </a:bodyPr>
+          <a:lstStyle/>
+          <a:p>
+            <a:r>
+              <a:rPr lang="en-US" dirty="0"/>
+              <a:t>b)</a:t>
+            </a:r>
+          </a:p>
+        </p:txBody>
+      </p:sp>
     </p:spTree>
     <p:extLst>
       <p:ext uri="{BB962C8B-B14F-4D97-AF65-F5344CB8AC3E}">
         <p14:creationId xmlns:p14="http://schemas.microsoft.com/office/powerpoint/2010/main" val="3727645992"/>
+      </p:ext>
+    </p:extLst>
+  </p:cSld>
+  <p:clrMapOvr>
+    <a:masterClrMapping/>
+  </p:clrMapOvr>
+</p:sld>
+</file>
+
+<file path=ppt/slides/slide3.xml><?xml version="1.0" encoding="utf-8"?>
+<p:sld xmlns:a="http://schemas.openxmlformats.org/drawingml/2006/main" xmlns:r="http://schemas.openxmlformats.org/officeDocument/2006/relationships" xmlns:p="http://schemas.openxmlformats.org/presentationml/2006/main">
+  <p:cSld>
+    <p:spTree>
+      <p:nvGrpSpPr>
+        <p:cNvPr id="1" name=""/>
+        <p:cNvGrpSpPr/>
+        <p:nvPr/>
+      </p:nvGrpSpPr>
+      <p:grpSpPr>
+        <a:xfrm>
+          <a:off x="0" y="0"/>
+          <a:ext cx="0" cy="0"/>
+          <a:chOff x="0" y="0"/>
+          <a:chExt cx="0" cy="0"/>
+        </a:xfrm>
+      </p:grpSpPr>
+      <p:pic>
+        <p:nvPicPr>
+          <p:cNvPr id="5" name="Picture 4" descr="A picture containing chart&#10;&#10;Description automatically generated">
+            <a:extLst>
+              <a:ext uri="{FF2B5EF4-FFF2-40B4-BE49-F238E27FC236}">
+                <a16:creationId xmlns:a16="http://schemas.microsoft.com/office/drawing/2014/main" id="{80E89A6A-95C9-374E-8D66-AE892F2FC353}"/>
+              </a:ext>
+            </a:extLst>
+          </p:cNvPr>
+          <p:cNvPicPr>
+            <a:picLocks noChangeAspect="1"/>
+          </p:cNvPicPr>
+          <p:nvPr/>
+        </p:nvPicPr>
+        <p:blipFill rotWithShape="1">
+          <a:blip r:embed="rId2"/>
+          <a:srcRect r="33105"/>
+          <a:stretch/>
+        </p:blipFill>
+        <p:spPr>
+          <a:xfrm>
+            <a:off x="3161271" y="0"/>
+            <a:ext cx="3214816" cy="3203832"/>
+          </a:xfrm>
+          <a:prstGeom prst="rect">
+            <a:avLst/>
+          </a:prstGeom>
+        </p:spPr>
+      </p:pic>
+      <p:pic>
+        <p:nvPicPr>
+          <p:cNvPr id="7" name="Picture 6" descr="A picture containing text&#10;&#10;Description automatically generated">
+            <a:extLst>
+              <a:ext uri="{FF2B5EF4-FFF2-40B4-BE49-F238E27FC236}">
+                <a16:creationId xmlns:a16="http://schemas.microsoft.com/office/drawing/2014/main" id="{73FD07F2-5207-DE4A-B86A-E020E50F34C6}"/>
+              </a:ext>
+            </a:extLst>
+          </p:cNvPr>
+          <p:cNvPicPr>
+            <a:picLocks noChangeAspect="1"/>
+          </p:cNvPicPr>
+          <p:nvPr/>
+        </p:nvPicPr>
+        <p:blipFill rotWithShape="1">
+          <a:blip r:embed="rId3"/>
+          <a:srcRect r="33105"/>
+          <a:stretch/>
+        </p:blipFill>
+        <p:spPr>
+          <a:xfrm>
+            <a:off x="3161270" y="3332891"/>
+            <a:ext cx="3214816" cy="3203832"/>
+          </a:xfrm>
+          <a:prstGeom prst="rect">
+            <a:avLst/>
+          </a:prstGeom>
+        </p:spPr>
+      </p:pic>
+      <p:pic>
+        <p:nvPicPr>
+          <p:cNvPr id="8" name="Picture 7" descr="A picture containing text&#10;&#10;Description automatically generated">
+            <a:extLst>
+              <a:ext uri="{FF2B5EF4-FFF2-40B4-BE49-F238E27FC236}">
+                <a16:creationId xmlns:a16="http://schemas.microsoft.com/office/drawing/2014/main" id="{9720FCD3-7562-B542-A7B4-D08191B53930}"/>
+              </a:ext>
+            </a:extLst>
+          </p:cNvPr>
+          <p:cNvPicPr>
+            <a:picLocks noChangeAspect="1"/>
+          </p:cNvPicPr>
+          <p:nvPr/>
+        </p:nvPicPr>
+        <p:blipFill rotWithShape="1">
+          <a:blip r:embed="rId3"/>
+          <a:srcRect l="63724" t="40861" b="31755"/>
+          <a:stretch/>
+        </p:blipFill>
+        <p:spPr>
+          <a:xfrm>
+            <a:off x="5721179" y="2829697"/>
+            <a:ext cx="1743331" cy="877330"/>
+          </a:xfrm>
+          <a:prstGeom prst="rect">
+            <a:avLst/>
+          </a:prstGeom>
+        </p:spPr>
+      </p:pic>
+    </p:spTree>
+    <p:extLst>
+      <p:ext uri="{BB962C8B-B14F-4D97-AF65-F5344CB8AC3E}">
+        <p14:creationId xmlns:p14="http://schemas.microsoft.com/office/powerpoint/2010/main" val="2050085161"/>
       </p:ext>
     </p:extLst>
   </p:cSld>

</xml_diff>